<commit_message>
Update modules from security/policy check
- removed all scripts that are installed by NuGet
- removed inappropriate language from some
- updated slides to replace potentially insensitive wording
</commit_message>
<xml_diff>
--- a/ConnectorActionableMsgs/02 Cards and Actions/03 Processing Actions.pptx
+++ b/ConnectorActionableMsgs/02 Cards and Actions/03 Processing Actions.pptx
@@ -267,7 +267,7 @@
               <a:rPr lang="en-US" smtClean="0">
                 <a:latin typeface="Segoe UI" pitchFamily="34" charset="0"/>
               </a:rPr>
-              <a:t>9/11/2018 7:42 AM</a:t>
+              <a:t>9/28/18 2:14 PM</a:t>
             </a:fld>
             <a:endParaRPr lang="en-US" dirty="0">
               <a:latin typeface="Segoe UI" pitchFamily="34" charset="0"/>
@@ -561,7 +561,7 @@
           <a:p>
             <a:fld id="{D18B56EA-E28F-4F92-9F16-7A6F2501B303}" type="datetime8">
               <a:rPr lang="en-US" smtClean="0"/>
-              <a:t>9/11/2018 7:39 AM</a:t>
+              <a:t>9/28/18 2:14 PM</a:t>
             </a:fld>
             <a:endParaRPr lang="en-US" dirty="0"/>
           </a:p>
@@ -1049,7 +1049,7 @@
                 <a:tabLst/>
                 <a:defRPr/>
               </a:pPr>
-              <a:t>9/11/2018 7:39 AM</a:t>
+              <a:t>9/28/18 2:14 PM</a:t>
             </a:fld>
             <a:endParaRPr kumimoji="0" lang="en-US" sz="1200" b="0" i="0" u="none" strike="noStrike" kern="1200" cap="none" spc="0" normalizeH="0" baseline="0" noProof="0" dirty="0">
               <a:ln>
@@ -1347,7 +1347,7 @@
           <a:p>
             <a:fld id="{D18B56EA-E28F-4F92-9F16-7A6F2501B303}" type="datetime8">
               <a:rPr lang="en-US" smtClean="0"/>
-              <a:t>9/11/2018 7:39 AM</a:t>
+              <a:t>9/28/18 2:14 PM</a:t>
             </a:fld>
             <a:endParaRPr lang="en-US" dirty="0"/>
           </a:p>
@@ -1645,7 +1645,7 @@
                 <a:tabLst/>
                 <a:defRPr/>
               </a:pPr>
-              <a:t>9/11/2018 7:39 AM</a:t>
+              <a:t>9/28/18 2:14 PM</a:t>
             </a:fld>
             <a:endParaRPr kumimoji="0" lang="en-US" sz="1200" b="0" i="0" u="none" strike="noStrike" kern="1200" cap="none" spc="0" normalizeH="0" baseline="0" noProof="0" dirty="0">
               <a:ln>
@@ -2006,7 +2006,7 @@
                 <a:tabLst/>
                 <a:defRPr/>
               </a:pPr>
-              <a:t>9/11/2018 7:39 AM</a:t>
+              <a:t>9/28/18 2:14 PM</a:t>
             </a:fld>
             <a:endParaRPr kumimoji="0" lang="en-US" sz="1200" b="0" i="0" u="none" strike="noStrike" kern="1200" cap="none" spc="0" normalizeH="0" baseline="0" noProof="0" dirty="0">
               <a:ln>
@@ -2259,7 +2259,7 @@
           <a:p>
             <a:fld id="{D18B56EA-E28F-4F92-9F16-7A6F2501B303}" type="datetime8">
               <a:rPr lang="en-US" smtClean="0"/>
-              <a:t>9/11/2018 7:39 AM</a:t>
+              <a:t>9/28/18 2:14 PM</a:t>
             </a:fld>
             <a:endParaRPr lang="en-US" dirty="0"/>
           </a:p>
@@ -2440,7 +2440,7 @@
           <a:p>
             <a:fld id="{D18B56EA-E28F-4F92-9F16-7A6F2501B303}" type="datetime8">
               <a:rPr lang="en-US" smtClean="0"/>
-              <a:t>9/11/2018 7:39 AM</a:t>
+              <a:t>9/28/18 2:14 PM</a:t>
             </a:fld>
             <a:endParaRPr lang="en-US" dirty="0"/>
           </a:p>
@@ -2621,7 +2621,7 @@
           <a:p>
             <a:fld id="{D18B56EA-E28F-4F92-9F16-7A6F2501B303}" type="datetime8">
               <a:rPr lang="en-US" smtClean="0"/>
-              <a:t>9/11/2018 7:39 AM</a:t>
+              <a:t>9/28/18 2:14 PM</a:t>
             </a:fld>
             <a:endParaRPr lang="en-US" dirty="0"/>
           </a:p>
@@ -2907,7 +2907,7 @@
                 <a:tabLst/>
                 <a:defRPr/>
               </a:pPr>
-              <a:t>9/11/2018 7:39 AM</a:t>
+              <a:t>9/28/18 2:14 PM</a:t>
             </a:fld>
             <a:endParaRPr kumimoji="0" lang="en-US" sz="1200" b="0" i="0" u="none" strike="noStrike" kern="1200" cap="none" spc="0" normalizeH="0" baseline="0" noProof="0" dirty="0">
               <a:ln>
@@ -3240,7 +3240,7 @@
           <a:p>
             <a:fld id="{D18B56EA-E28F-4F92-9F16-7A6F2501B303}" type="datetime8">
               <a:rPr lang="en-US" smtClean="0"/>
-              <a:t>9/11/2018 7:39 AM</a:t>
+              <a:t>9/28/18 2:14 PM</a:t>
             </a:fld>
             <a:endParaRPr lang="en-US" dirty="0"/>
           </a:p>
@@ -3477,7 +3477,7 @@
           <a:p>
             <a:fld id="{D18B56EA-E28F-4F92-9F16-7A6F2501B303}" type="datetime8">
               <a:rPr lang="en-US" smtClean="0"/>
-              <a:t>9/11/2018 7:39 AM</a:t>
+              <a:t>9/28/18 2:14 PM</a:t>
             </a:fld>
             <a:endParaRPr lang="en-US" dirty="0"/>
           </a:p>
@@ -3781,7 +3781,7 @@
           <a:p>
             <a:fld id="{D18B56EA-E28F-4F92-9F16-7A6F2501B303}" type="datetime8">
               <a:rPr lang="en-US" smtClean="0"/>
-              <a:t>9/11/2018 7:39 AM</a:t>
+              <a:t>9/28/18 2:14 PM</a:t>
             </a:fld>
             <a:endParaRPr lang="en-US" dirty="0"/>
           </a:p>
@@ -4025,7 +4025,7 @@
           <a:p>
             <a:fld id="{D18B56EA-E28F-4F92-9F16-7A6F2501B303}" type="datetime8">
               <a:rPr lang="en-US" smtClean="0"/>
-              <a:t>9/11/2018 7:39 AM</a:t>
+              <a:t>9/28/18 2:14 PM</a:t>
             </a:fld>
             <a:endParaRPr lang="en-US" dirty="0"/>
           </a:p>
@@ -4151,7 +4151,7 @@
             </a:pPr>
             <a:r>
               <a:rPr lang="en-US" dirty="0"/>
-              <a:t>Use the Actionable Email Developer Dashboard to register providers (whitelist URLs)</a:t>
+              <a:t>Use the Actionable Email Developer Dashboard to register providers (approved URLs)</a:t>
             </a:r>
           </a:p>
           <a:p>
@@ -4307,7 +4307,7 @@
           <a:p>
             <a:fld id="{D18B56EA-E28F-4F92-9F16-7A6F2501B303}" type="datetime8">
               <a:rPr lang="en-US" smtClean="0"/>
-              <a:t>9/11/2018 7:42 AM</a:t>
+              <a:t>9/28/18 2:14 PM</a:t>
             </a:fld>
             <a:endParaRPr lang="en-US" dirty="0"/>
           </a:p>
@@ -4593,7 +4593,7 @@
           <a:p>
             <a:fld id="{D18B56EA-E28F-4F92-9F16-7A6F2501B303}" type="datetime8">
               <a:rPr lang="en-US" smtClean="0"/>
-              <a:t>9/11/2018 7:39 AM</a:t>
+              <a:t>9/28/18 2:14 PM</a:t>
             </a:fld>
             <a:endParaRPr lang="en-US" dirty="0"/>
           </a:p>
@@ -4959,7 +4959,7 @@
                 <a:tabLst/>
                 <a:defRPr/>
               </a:pPr>
-              <a:t>9/11/2018 7:39 AM</a:t>
+              <a:t>9/28/18 2:14 PM</a:t>
             </a:fld>
             <a:endParaRPr kumimoji="0" lang="en-US" sz="1200" b="0" i="0" u="none" strike="noStrike" kern="1200" cap="none" spc="0" normalizeH="0" baseline="0" noProof="0" dirty="0">
               <a:ln>

</xml_diff>

<commit_message>
Connector module 2 refresh
</commit_message>
<xml_diff>
--- a/ConnectorActionableMsgs/02 Cards and Actions/03 Processing Actions.pptx
+++ b/ConnectorActionableMsgs/02 Cards and Actions/03 Processing Actions.pptx
@@ -267,7 +267,7 @@
               <a:rPr lang="en-US" smtClean="0">
                 <a:latin typeface="Segoe UI" pitchFamily="34" charset="0"/>
               </a:rPr>
-              <a:t>9/28/18 2:14 PM</a:t>
+              <a:t>12/11/2018 8:23 PM</a:t>
             </a:fld>
             <a:endParaRPr lang="en-US" dirty="0">
               <a:latin typeface="Segoe UI" pitchFamily="34" charset="0"/>
@@ -561,7 +561,7 @@
           <a:p>
             <a:fld id="{D18B56EA-E28F-4F92-9F16-7A6F2501B303}" type="datetime8">
               <a:rPr lang="en-US" smtClean="0"/>
-              <a:t>9/28/18 2:14 PM</a:t>
+              <a:t>12/11/2018 8:23 PM</a:t>
             </a:fld>
             <a:endParaRPr lang="en-US" dirty="0"/>
           </a:p>
@@ -1049,7 +1049,7 @@
                 <a:tabLst/>
                 <a:defRPr/>
               </a:pPr>
-              <a:t>9/28/18 2:14 PM</a:t>
+              <a:t>12/11/2018 8:23 PM</a:t>
             </a:fld>
             <a:endParaRPr kumimoji="0" lang="en-US" sz="1200" b="0" i="0" u="none" strike="noStrike" kern="1200" cap="none" spc="0" normalizeH="0" baseline="0" noProof="0" dirty="0">
               <a:ln>
@@ -1347,7 +1347,7 @@
           <a:p>
             <a:fld id="{D18B56EA-E28F-4F92-9F16-7A6F2501B303}" type="datetime8">
               <a:rPr lang="en-US" smtClean="0"/>
-              <a:t>9/28/18 2:14 PM</a:t>
+              <a:t>12/11/2018 8:23 PM</a:t>
             </a:fld>
             <a:endParaRPr lang="en-US" dirty="0"/>
           </a:p>
@@ -1645,7 +1645,7 @@
                 <a:tabLst/>
                 <a:defRPr/>
               </a:pPr>
-              <a:t>9/28/18 2:14 PM</a:t>
+              <a:t>12/11/2018 8:23 PM</a:t>
             </a:fld>
             <a:endParaRPr kumimoji="0" lang="en-US" sz="1200" b="0" i="0" u="none" strike="noStrike" kern="1200" cap="none" spc="0" normalizeH="0" baseline="0" noProof="0" dirty="0">
               <a:ln>
@@ -2006,7 +2006,7 @@
                 <a:tabLst/>
                 <a:defRPr/>
               </a:pPr>
-              <a:t>9/28/18 2:14 PM</a:t>
+              <a:t>12/11/2018 8:23 PM</a:t>
             </a:fld>
             <a:endParaRPr kumimoji="0" lang="en-US" sz="1200" b="0" i="0" u="none" strike="noStrike" kern="1200" cap="none" spc="0" normalizeH="0" baseline="0" noProof="0" dirty="0">
               <a:ln>
@@ -2259,7 +2259,7 @@
           <a:p>
             <a:fld id="{D18B56EA-E28F-4F92-9F16-7A6F2501B303}" type="datetime8">
               <a:rPr lang="en-US" smtClean="0"/>
-              <a:t>9/28/18 2:14 PM</a:t>
+              <a:t>12/11/2018 8:23 PM</a:t>
             </a:fld>
             <a:endParaRPr lang="en-US" dirty="0"/>
           </a:p>
@@ -2440,7 +2440,7 @@
           <a:p>
             <a:fld id="{D18B56EA-E28F-4F92-9F16-7A6F2501B303}" type="datetime8">
               <a:rPr lang="en-US" smtClean="0"/>
-              <a:t>9/28/18 2:14 PM</a:t>
+              <a:t>12/11/2018 8:23 PM</a:t>
             </a:fld>
             <a:endParaRPr lang="en-US" dirty="0"/>
           </a:p>
@@ -2621,7 +2621,7 @@
           <a:p>
             <a:fld id="{D18B56EA-E28F-4F92-9F16-7A6F2501B303}" type="datetime8">
               <a:rPr lang="en-US" smtClean="0"/>
-              <a:t>9/28/18 2:14 PM</a:t>
+              <a:t>12/11/2018 8:23 PM</a:t>
             </a:fld>
             <a:endParaRPr lang="en-US" dirty="0"/>
           </a:p>
@@ -2907,7 +2907,7 @@
                 <a:tabLst/>
                 <a:defRPr/>
               </a:pPr>
-              <a:t>9/28/18 2:14 PM</a:t>
+              <a:t>12/11/2018 8:23 PM</a:t>
             </a:fld>
             <a:endParaRPr kumimoji="0" lang="en-US" sz="1200" b="0" i="0" u="none" strike="noStrike" kern="1200" cap="none" spc="0" normalizeH="0" baseline="0" noProof="0" dirty="0">
               <a:ln>
@@ -3240,7 +3240,7 @@
           <a:p>
             <a:fld id="{D18B56EA-E28F-4F92-9F16-7A6F2501B303}" type="datetime8">
               <a:rPr lang="en-US" smtClean="0"/>
-              <a:t>9/28/18 2:14 PM</a:t>
+              <a:t>12/11/2018 8:23 PM</a:t>
             </a:fld>
             <a:endParaRPr lang="en-US" dirty="0"/>
           </a:p>
@@ -3477,7 +3477,7 @@
           <a:p>
             <a:fld id="{D18B56EA-E28F-4F92-9F16-7A6F2501B303}" type="datetime8">
               <a:rPr lang="en-US" smtClean="0"/>
-              <a:t>9/28/18 2:14 PM</a:t>
+              <a:t>12/11/2018 8:23 PM</a:t>
             </a:fld>
             <a:endParaRPr lang="en-US" dirty="0"/>
           </a:p>
@@ -3781,7 +3781,7 @@
           <a:p>
             <a:fld id="{D18B56EA-E28F-4F92-9F16-7A6F2501B303}" type="datetime8">
               <a:rPr lang="en-US" smtClean="0"/>
-              <a:t>9/28/18 2:14 PM</a:t>
+              <a:t>12/11/2018 8:23 PM</a:t>
             </a:fld>
             <a:endParaRPr lang="en-US" dirty="0"/>
           </a:p>
@@ -4025,7 +4025,7 @@
           <a:p>
             <a:fld id="{D18B56EA-E28F-4F92-9F16-7A6F2501B303}" type="datetime8">
               <a:rPr lang="en-US" smtClean="0"/>
-              <a:t>9/28/18 2:14 PM</a:t>
+              <a:t>12/11/2018 8:23 PM</a:t>
             </a:fld>
             <a:endParaRPr lang="en-US" dirty="0"/>
           </a:p>
@@ -4307,7 +4307,7 @@
           <a:p>
             <a:fld id="{D18B56EA-E28F-4F92-9F16-7A6F2501B303}" type="datetime8">
               <a:rPr lang="en-US" smtClean="0"/>
-              <a:t>9/28/18 2:14 PM</a:t>
+              <a:t>12/11/2018 8:25 PM</a:t>
             </a:fld>
             <a:endParaRPr lang="en-US" dirty="0"/>
           </a:p>
@@ -4593,7 +4593,7 @@
           <a:p>
             <a:fld id="{D18B56EA-E28F-4F92-9F16-7A6F2501B303}" type="datetime8">
               <a:rPr lang="en-US" smtClean="0"/>
-              <a:t>9/28/18 2:14 PM</a:t>
+              <a:t>12/11/2018 8:23 PM</a:t>
             </a:fld>
             <a:endParaRPr lang="en-US" dirty="0"/>
           </a:p>
@@ -4959,7 +4959,7 @@
                 <a:tabLst/>
                 <a:defRPr/>
               </a:pPr>
-              <a:t>9/28/18 2:14 PM</a:t>
+              <a:t>12/11/2018 8:23 PM</a:t>
             </a:fld>
             <a:endParaRPr kumimoji="0" lang="en-US" sz="1200" b="0" i="0" u="none" strike="noStrike" kern="1200" cap="none" spc="0" normalizeH="0" baseline="0" noProof="0" dirty="0">
               <a:ln>
@@ -24144,10 +24144,10 @@
       </p:pic>
       <p:pic>
         <p:nvPicPr>
-          <p:cNvPr id="2" name="Picture 1">
+          <p:cNvPr id="4" name="Picture 3">
             <a:extLst>
               <a:ext uri="{FF2B5EF4-FFF2-40B4-BE49-F238E27FC236}">
-                <a16:creationId xmlns:a16="http://schemas.microsoft.com/office/drawing/2014/main" id="{3BE8C9AA-79C8-44ED-93BE-23CF043B84FA}"/>
+                <a16:creationId xmlns:a16="http://schemas.microsoft.com/office/drawing/2014/main" id="{4F422C7F-BAC6-4ADD-A6D9-3B7B9FD7D46F}"/>
               </a:ext>
             </a:extLst>
           </p:cNvPr>
@@ -24158,13 +24158,13 @@
         </p:nvPicPr>
         <p:blipFill rotWithShape="1">
           <a:blip r:embed="rId4"/>
-          <a:srcRect b="18888"/>
+          <a:srcRect b="24876"/>
           <a:stretch/>
         </p:blipFill>
         <p:spPr>
           <a:xfrm>
-            <a:off x="2724527" y="1605546"/>
-            <a:ext cx="7217141" cy="4634142"/>
+            <a:off x="2023478" y="1698694"/>
+            <a:ext cx="8389518" cy="4136959"/>
           </a:xfrm>
           <a:prstGeom prst="rect">
             <a:avLst/>
@@ -24185,8 +24185,8 @@
         </p:nvSpPr>
         <p:spPr bwMode="auto">
           <a:xfrm>
-            <a:off x="1935481" y="5707803"/>
-            <a:ext cx="8534400" cy="625033"/>
+            <a:off x="1966593" y="5707803"/>
+            <a:ext cx="8463947" cy="625033"/>
           </a:xfrm>
           <a:prstGeom prst="rect">
             <a:avLst/>
@@ -24267,8 +24267,8 @@
         </p:nvSpPr>
         <p:spPr>
           <a:xfrm>
-            <a:off x="4154980" y="5835653"/>
-            <a:ext cx="4126514" cy="369332"/>
+            <a:off x="3515286" y="5835653"/>
+            <a:ext cx="5405903" cy="369332"/>
           </a:xfrm>
           <a:prstGeom prst="rect">
             <a:avLst/>
@@ -24287,7 +24287,7 @@
                   <a:schemeClr val="bg2"/>
                 </a:solidFill>
               </a:rPr>
-              <a:t>https://outlook.office.com/connectors</a:t>
+              <a:t>https://outlook.office.com/connectors/oam/publish</a:t>
             </a:r>
           </a:p>
         </p:txBody>
@@ -24315,7 +24315,7 @@
           <a:p>
             <a:r>
               <a:rPr lang="en-US" dirty="0"/>
-              <a:t>Connectors Developer Dashboard</a:t>
+              <a:t>Actionable Email Developer Dashboard</a:t>
             </a:r>
           </a:p>
         </p:txBody>

</xml_diff>